<commit_message>
added updated ppts, no missing data set, practice code, value label code
</commit_message>
<xml_diff>
--- a/ppts/2_Babbie_7e_PPT_ch_01.pptx
+++ b/ppts/2_Babbie_7e_PPT_ch_01.pptx
@@ -223,7 +223,7 @@
           <a:p>
             <a:fld id="{0C26D623-450D-E746-82AE-D1ED40F828C8}" type="datetimeFigureOut">
               <a:rPr lang="en-US" smtClean="0"/>
-              <a:t>9/6/16</a:t>
+              <a:t>9/14/16</a:t>
             </a:fld>
             <a:endParaRPr lang="en-US"/>
           </a:p>
@@ -3125,11 +3125,7 @@
             </a:r>
             <a:r>
               <a:rPr lang="en-US" baseline="0" dirty="0" smtClean="0"/>
-              <a:t>/reality make sense and are empirically </a:t>
-            </a:r>
-            <a:r>
-              <a:rPr lang="en-US" baseline="0" dirty="0" smtClean="0"/>
-              <a:t>verifiable</a:t>
+              <a:t>/reality make sense and are empirically verifiable</a:t>
             </a:r>
           </a:p>
           <a:p>
@@ -3735,7 +3731,7 @@
           <a:p>
             <a:fld id="{C6D8846F-46A3-EB4B-9371-B1E8B5709ABC}" type="datetimeFigureOut">
               <a:rPr lang="en-US" smtClean="0"/>
-              <a:t>9/6/16</a:t>
+              <a:t>9/14/16</a:t>
             </a:fld>
             <a:endParaRPr lang="en-US"/>
           </a:p>
@@ -3930,7 +3926,7 @@
           <a:p>
             <a:fld id="{C6D8846F-46A3-EB4B-9371-B1E8B5709ABC}" type="datetimeFigureOut">
               <a:rPr lang="en-US" smtClean="0"/>
-              <a:t>9/6/16</a:t>
+              <a:t>9/14/16</a:t>
             </a:fld>
             <a:endParaRPr lang="en-US"/>
           </a:p>
@@ -4281,7 +4277,7 @@
           <a:p>
             <a:fld id="{C6D8846F-46A3-EB4B-9371-B1E8B5709ABC}" type="datetimeFigureOut">
               <a:rPr lang="en-US" smtClean="0"/>
-              <a:t>9/6/16</a:t>
+              <a:t>9/14/16</a:t>
             </a:fld>
             <a:endParaRPr lang="en-US"/>
           </a:p>
@@ -4516,7 +4512,7 @@
           <a:p>
             <a:fld id="{C6D8846F-46A3-EB4B-9371-B1E8B5709ABC}" type="datetimeFigureOut">
               <a:rPr lang="en-US" smtClean="0"/>
-              <a:t>9/6/16</a:t>
+              <a:t>9/14/16</a:t>
             </a:fld>
             <a:endParaRPr lang="en-US"/>
           </a:p>
@@ -4898,7 +4894,7 @@
           <a:p>
             <a:fld id="{C6D8846F-46A3-EB4B-9371-B1E8B5709ABC}" type="datetimeFigureOut">
               <a:rPr lang="en-US" smtClean="0"/>
-              <a:t>9/6/16</a:t>
+              <a:t>9/14/16</a:t>
             </a:fld>
             <a:endParaRPr lang="en-US"/>
           </a:p>
@@ -5217,7 +5213,7 @@
           <a:p>
             <a:fld id="{C6D8846F-46A3-EB4B-9371-B1E8B5709ABC}" type="datetimeFigureOut">
               <a:rPr lang="en-US" smtClean="0"/>
-              <a:t>9/6/16</a:t>
+              <a:t>9/14/16</a:t>
             </a:fld>
             <a:endParaRPr lang="en-US"/>
           </a:p>
@@ -5609,7 +5605,7 @@
           <a:p>
             <a:fld id="{C6D8846F-46A3-EB4B-9371-B1E8B5709ABC}" type="datetimeFigureOut">
               <a:rPr lang="en-US" smtClean="0"/>
-              <a:t>9/6/16</a:t>
+              <a:t>9/14/16</a:t>
             </a:fld>
             <a:endParaRPr lang="en-US"/>
           </a:p>
@@ -5734,7 +5730,7 @@
           <a:p>
             <a:fld id="{C6D8846F-46A3-EB4B-9371-B1E8B5709ABC}" type="datetimeFigureOut">
               <a:rPr lang="en-US" smtClean="0"/>
-              <a:t>9/6/16</a:t>
+              <a:t>9/14/16</a:t>
             </a:fld>
             <a:endParaRPr lang="en-US"/>
           </a:p>
@@ -5836,7 +5832,7 @@
           <a:p>
             <a:fld id="{C6D8846F-46A3-EB4B-9371-B1E8B5709ABC}" type="datetimeFigureOut">
               <a:rPr lang="en-US" smtClean="0"/>
-              <a:t>9/6/16</a:t>
+              <a:t>9/14/16</a:t>
             </a:fld>
             <a:endParaRPr lang="en-US"/>
           </a:p>
@@ -6111,7 +6107,7 @@
           <a:p>
             <a:fld id="{C6D8846F-46A3-EB4B-9371-B1E8B5709ABC}" type="datetimeFigureOut">
               <a:rPr lang="en-US" smtClean="0"/>
-              <a:t>9/6/16</a:t>
+              <a:t>9/14/16</a:t>
             </a:fld>
             <a:endParaRPr lang="en-US"/>
           </a:p>
@@ -6573,7 +6569,7 @@
           <a:p>
             <a:fld id="{C6D8846F-46A3-EB4B-9371-B1E8B5709ABC}" type="datetimeFigureOut">
               <a:rPr lang="en-US" smtClean="0"/>
-              <a:t>9/6/16</a:t>
+              <a:t>9/14/16</a:t>
             </a:fld>
             <a:endParaRPr lang="en-US"/>
           </a:p>
@@ -6823,7 +6819,7 @@
           <a:p>
             <a:fld id="{C6D8846F-46A3-EB4B-9371-B1E8B5709ABC}" type="datetimeFigureOut">
               <a:rPr lang="en-US" smtClean="0"/>
-              <a:t>9/6/16</a:t>
+              <a:t>9/14/16</a:t>
             </a:fld>
             <a:endParaRPr lang="en-US"/>
           </a:p>
@@ -7588,6 +7584,18 @@
   <p:clrMapOvr>
     <a:masterClrMapping/>
   </p:clrMapOvr>
+  <mc:AlternateContent xmlns:mc="http://schemas.openxmlformats.org/markup-compatibility/2006">
+    <mc:Choice xmlns:p14="http://schemas.microsoft.com/office/powerpoint/2010/main" Requires="p14">
+      <p:transition spd="med" p14:dur="700">
+        <p:fade/>
+      </p:transition>
+    </mc:Choice>
+    <mc:Fallback>
+      <p:transition xmlns:p14="http://schemas.microsoft.com/office/powerpoint/2010/main" spd="med">
+        <p:fade/>
+      </p:transition>
+    </mc:Fallback>
+  </mc:AlternateContent>
 </p:sld>
 </file>
 
@@ -7697,6 +7705,18 @@
   <p:clrMapOvr>
     <a:masterClrMapping/>
   </p:clrMapOvr>
+  <mc:AlternateContent xmlns:mc="http://schemas.openxmlformats.org/markup-compatibility/2006">
+    <mc:Choice xmlns:p14="http://schemas.microsoft.com/office/powerpoint/2010/main" Requires="p14">
+      <p:transition spd="med" p14:dur="700">
+        <p:fade/>
+      </p:transition>
+    </mc:Choice>
+    <mc:Fallback>
+      <p:transition xmlns:p14="http://schemas.microsoft.com/office/powerpoint/2010/main" spd="med">
+        <p:fade/>
+      </p:transition>
+    </mc:Fallback>
+  </mc:AlternateContent>
 </p:sld>
 </file>
 
@@ -7795,6 +7815,18 @@
   <p:clrMapOvr>
     <a:masterClrMapping/>
   </p:clrMapOvr>
+  <mc:AlternateContent xmlns:mc="http://schemas.openxmlformats.org/markup-compatibility/2006">
+    <mc:Choice xmlns:p14="http://schemas.microsoft.com/office/powerpoint/2010/main" Requires="p14">
+      <p:transition spd="med" p14:dur="700">
+        <p:fade/>
+      </p:transition>
+    </mc:Choice>
+    <mc:Fallback>
+      <p:transition xmlns:p14="http://schemas.microsoft.com/office/powerpoint/2010/main" spd="med">
+        <p:fade/>
+      </p:transition>
+    </mc:Fallback>
+  </mc:AlternateContent>
 </p:sld>
 </file>
 
@@ -7904,6 +7936,18 @@
   <p:clrMapOvr>
     <a:masterClrMapping/>
   </p:clrMapOvr>
+  <mc:AlternateContent xmlns:mc="http://schemas.openxmlformats.org/markup-compatibility/2006">
+    <mc:Choice xmlns:p14="http://schemas.microsoft.com/office/powerpoint/2010/main" Requires="p14">
+      <p:transition spd="med" p14:dur="700">
+        <p:fade/>
+      </p:transition>
+    </mc:Choice>
+    <mc:Fallback>
+      <p:transition xmlns:p14="http://schemas.microsoft.com/office/powerpoint/2010/main" spd="med">
+        <p:fade/>
+      </p:transition>
+    </mc:Fallback>
+  </mc:AlternateContent>
 </p:sld>
 </file>
 
@@ -8001,6 +8045,18 @@
   <p:clrMapOvr>
     <a:masterClrMapping/>
   </p:clrMapOvr>
+  <mc:AlternateContent xmlns:mc="http://schemas.openxmlformats.org/markup-compatibility/2006">
+    <mc:Choice xmlns:p14="http://schemas.microsoft.com/office/powerpoint/2010/main" Requires="p14">
+      <p:transition spd="med" p14:dur="700">
+        <p:fade/>
+      </p:transition>
+    </mc:Choice>
+    <mc:Fallback>
+      <p:transition xmlns:p14="http://schemas.microsoft.com/office/powerpoint/2010/main" spd="med">
+        <p:fade/>
+      </p:transition>
+    </mc:Fallback>
+  </mc:AlternateContent>
 </p:sld>
 </file>
 
@@ -8099,6 +8155,18 @@
   <p:clrMapOvr>
     <a:masterClrMapping/>
   </p:clrMapOvr>
+  <mc:AlternateContent xmlns:mc="http://schemas.openxmlformats.org/markup-compatibility/2006">
+    <mc:Choice xmlns:p14="http://schemas.microsoft.com/office/powerpoint/2010/main" Requires="p14">
+      <p:transition spd="med" p14:dur="700">
+        <p:fade/>
+      </p:transition>
+    </mc:Choice>
+    <mc:Fallback>
+      <p:transition xmlns:p14="http://schemas.microsoft.com/office/powerpoint/2010/main" spd="med">
+        <p:fade/>
+      </p:transition>
+    </mc:Fallback>
+  </mc:AlternateContent>
 </p:sld>
 </file>
 
@@ -8194,7 +8262,6 @@
               <a:rPr lang="en-US" dirty="0"/>
               <a:t>Logical groupings of attributes. The larger category to which those attributes belong</a:t>
             </a:r>
-            <a:endParaRPr lang="en-US" dirty="0"/>
           </a:p>
         </p:txBody>
       </p:sp>
@@ -8208,6 +8275,18 @@
   <p:clrMapOvr>
     <a:masterClrMapping/>
   </p:clrMapOvr>
+  <mc:AlternateContent xmlns:mc="http://schemas.openxmlformats.org/markup-compatibility/2006">
+    <mc:Choice xmlns:p14="http://schemas.microsoft.com/office/powerpoint/2010/main" Requires="p14">
+      <p:transition spd="med" p14:dur="700">
+        <p:fade/>
+      </p:transition>
+    </mc:Choice>
+    <mc:Fallback>
+      <p:transition xmlns:p14="http://schemas.microsoft.com/office/powerpoint/2010/main" spd="med">
+        <p:fade/>
+      </p:transition>
+    </mc:Fallback>
+  </mc:AlternateContent>
 </p:sld>
 </file>
 
@@ -8255,7 +8334,6 @@
               <a:rPr lang="en-US" dirty="0"/>
               <a:t>Variables like education and prejudice and their attributes (educated/uneducated, prejudiced/unprejudiced) provide the foundation for examining causal relationships in social research.</a:t>
             </a:r>
-            <a:endParaRPr lang="en-US" dirty="0"/>
           </a:p>
         </p:txBody>
       </p:sp>
@@ -8278,7 +8356,6 @@
               <a:rPr lang="en-US" dirty="0"/>
               <a:t>Figure 1-2</a:t>
             </a:r>
-            <a:endParaRPr lang="en-US" dirty="0"/>
           </a:p>
         </p:txBody>
       </p:sp>
@@ -8319,6 +8396,18 @@
   <p:clrMapOvr>
     <a:masterClrMapping/>
   </p:clrMapOvr>
+  <mc:AlternateContent xmlns:mc="http://schemas.openxmlformats.org/markup-compatibility/2006">
+    <mc:Choice xmlns:p14="http://schemas.microsoft.com/office/powerpoint/2010/main" Requires="p14">
+      <p:transition spd="med" p14:dur="700">
+        <p:fade/>
+      </p:transition>
+    </mc:Choice>
+    <mc:Fallback>
+      <p:transition xmlns:p14="http://schemas.microsoft.com/office/powerpoint/2010/main" spd="med">
+        <p:fade/>
+      </p:transition>
+    </mc:Fallback>
+  </mc:AlternateContent>
 </p:sld>
 </file>
 
@@ -8366,7 +8455,6 @@
               <a:rPr lang="en-US" dirty="0"/>
               <a:t>Variables such as education and prejudice and their attributes (educated/uneducated, prejudiced/unprejudiced) are the foundation for the examination of causal relationships in social research.</a:t>
             </a:r>
-            <a:endParaRPr lang="en-US" dirty="0"/>
           </a:p>
         </p:txBody>
       </p:sp>
@@ -8389,7 +8477,6 @@
               <a:rPr lang="en-US" dirty="0"/>
               <a:t>Figure 1-3</a:t>
             </a:r>
-            <a:endParaRPr lang="en-US" dirty="0"/>
           </a:p>
         </p:txBody>
       </p:sp>
@@ -8430,6 +8517,18 @@
   <p:clrMapOvr>
     <a:masterClrMapping/>
   </p:clrMapOvr>
+  <mc:AlternateContent xmlns:mc="http://schemas.openxmlformats.org/markup-compatibility/2006">
+    <mc:Choice xmlns:p14="http://schemas.microsoft.com/office/powerpoint/2010/main" Requires="p14">
+      <p:transition spd="med" p14:dur="700">
+        <p:fade/>
+      </p:transition>
+    </mc:Choice>
+    <mc:Fallback>
+      <p:transition xmlns:p14="http://schemas.microsoft.com/office/powerpoint/2010/main" spd="med">
+        <p:fade/>
+      </p:transition>
+    </mc:Fallback>
+  </mc:AlternateContent>
 </p:sld>
 </file>
 
@@ -8549,7 +8648,6 @@
               <a:rPr lang="en-US" i="1" dirty="0"/>
               <a:t>Outcome</a:t>
             </a:r>
-            <a:endParaRPr lang="en-US" i="1" dirty="0"/>
           </a:p>
         </p:txBody>
       </p:sp>
@@ -8563,6 +8661,18 @@
   <p:clrMapOvr>
     <a:masterClrMapping/>
   </p:clrMapOvr>
+  <mc:AlternateContent xmlns:mc="http://schemas.openxmlformats.org/markup-compatibility/2006">
+    <mc:Choice xmlns:p14="http://schemas.microsoft.com/office/powerpoint/2010/main" Requires="p14">
+      <p:transition spd="med" p14:dur="700">
+        <p:fade/>
+      </p:transition>
+    </mc:Choice>
+    <mc:Fallback>
+      <p:transition xmlns:p14="http://schemas.microsoft.com/office/powerpoint/2010/main" spd="med">
+        <p:fade/>
+      </p:transition>
+    </mc:Fallback>
+  </mc:AlternateContent>
 </p:sld>
 </file>
 
@@ -8707,6 +8817,18 @@
   <p:clrMapOvr>
     <a:masterClrMapping/>
   </p:clrMapOvr>
+  <mc:AlternateContent xmlns:mc="http://schemas.openxmlformats.org/markup-compatibility/2006">
+    <mc:Choice xmlns:p14="http://schemas.microsoft.com/office/powerpoint/2010/main" Requires="p14">
+      <p:transition spd="med" p14:dur="700">
+        <p:fade/>
+      </p:transition>
+    </mc:Choice>
+    <mc:Fallback>
+      <p:transition xmlns:p14="http://schemas.microsoft.com/office/powerpoint/2010/main" spd="med">
+        <p:fade/>
+      </p:transition>
+    </mc:Fallback>
+  </mc:AlternateContent>
 </p:sld>
 </file>
 
@@ -8817,10 +8939,14 @@
   </p:clrMapOvr>
   <mc:AlternateContent xmlns:mc="http://schemas.openxmlformats.org/markup-compatibility/2006">
     <mc:Choice xmlns:p14="http://schemas.microsoft.com/office/powerpoint/2010/main" Requires="p14">
-      <p:transition spd="slow" p14:dur="2000"/>
+      <p:transition spd="med" p14:dur="700">
+        <p:fade/>
+      </p:transition>
     </mc:Choice>
     <mc:Fallback>
-      <p:transition xmlns:p14="http://schemas.microsoft.com/office/powerpoint/2010/main" spd="slow"/>
+      <p:transition xmlns:p14="http://schemas.microsoft.com/office/powerpoint/2010/main" spd="med">
+        <p:fade/>
+      </p:transition>
     </mc:Fallback>
   </mc:AlternateContent>
 </p:sld>
@@ -8862,7 +8988,6 @@
               <a:rPr lang="en-US" dirty="0"/>
               <a:t>Some Dialectics of Social Research</a:t>
             </a:r>
-            <a:endParaRPr lang="en-US" dirty="0"/>
           </a:p>
         </p:txBody>
       </p:sp>
@@ -8926,7 +9051,6 @@
               <a:rPr lang="en-US" dirty="0"/>
               <a:t>that identifies one or a few causal factors that generally impact a class of events</a:t>
             </a:r>
-            <a:endParaRPr lang="en-US" dirty="0"/>
           </a:p>
         </p:txBody>
       </p:sp>
@@ -8940,6 +9064,18 @@
   <p:clrMapOvr>
     <a:masterClrMapping/>
   </p:clrMapOvr>
+  <mc:AlternateContent xmlns:mc="http://schemas.openxmlformats.org/markup-compatibility/2006">
+    <mc:Choice xmlns:p14="http://schemas.microsoft.com/office/powerpoint/2010/main" Requires="p14">
+      <p:transition spd="med" p14:dur="700">
+        <p:fade/>
+      </p:transition>
+    </mc:Choice>
+    <mc:Fallback>
+      <p:transition xmlns:p14="http://schemas.microsoft.com/office/powerpoint/2010/main" spd="med">
+        <p:fade/>
+      </p:transition>
+    </mc:Fallback>
+  </mc:AlternateContent>
 </p:sld>
 </file>
 
@@ -9016,6 +9152,18 @@
   <p:clrMapOvr>
     <a:masterClrMapping/>
   </p:clrMapOvr>
+  <mc:AlternateContent xmlns:mc="http://schemas.openxmlformats.org/markup-compatibility/2006">
+    <mc:Choice xmlns:p14="http://schemas.microsoft.com/office/powerpoint/2010/main" Requires="p14">
+      <p:transition spd="med" p14:dur="700">
+        <p:fade/>
+      </p:transition>
+    </mc:Choice>
+    <mc:Fallback>
+      <p:transition xmlns:p14="http://schemas.microsoft.com/office/powerpoint/2010/main" spd="med">
+        <p:fade/>
+      </p:transition>
+    </mc:Fallback>
+  </mc:AlternateContent>
 </p:sld>
 </file>
 
@@ -9055,7 +9203,6 @@
               <a:rPr lang="en-US" dirty="0"/>
               <a:t>Some Dialectics of Social Research</a:t>
             </a:r>
-            <a:endParaRPr lang="en-US" dirty="0"/>
           </a:p>
         </p:txBody>
       </p:sp>
@@ -9111,7 +9258,6 @@
               <a:rPr lang="en-US" dirty="0"/>
               <a:t>logical argument in which specific expectations of hypotheses are developed on the basis of general principles/other theories.</a:t>
             </a:r>
-            <a:endParaRPr lang="en-US" dirty="0"/>
           </a:p>
         </p:txBody>
       </p:sp>
@@ -9125,11 +9271,23 @@
   <p:clrMapOvr>
     <a:masterClrMapping/>
   </p:clrMapOvr>
+  <mc:AlternateContent xmlns:mc="http://schemas.openxmlformats.org/markup-compatibility/2006">
+    <mc:Choice xmlns:p14="http://schemas.microsoft.com/office/powerpoint/2010/main" Requires="p14">
+      <p:transition spd="med" p14:dur="700">
+        <p:fade/>
+      </p:transition>
+    </mc:Choice>
+    <mc:Fallback>
+      <p:transition xmlns:p14="http://schemas.microsoft.com/office/powerpoint/2010/main" spd="med">
+        <p:fade/>
+      </p:transition>
+    </mc:Fallback>
+  </mc:AlternateContent>
 </p:sld>
 </file>
 
 <file path=ppt/slides/slide23.xml><?xml version="1.0" encoding="utf-8"?>
-<p:sld xmlns:a="http://schemas.openxmlformats.org/drawingml/2006/main" xmlns:r="http://schemas.openxmlformats.org/officeDocument/2006/relationships" xmlns:p="http://schemas.openxmlformats.org/presentationml/2006/main">
+<p:sld xmlns:a="http://schemas.openxmlformats.org/drawingml/2006/main" xmlns:r="http://schemas.openxmlformats.org/officeDocument/2006/relationships" xmlns:p="http://schemas.openxmlformats.org/presentationml/2006/main" show="0">
   <p:cSld>
     <p:spTree>
       <p:nvGrpSpPr>
@@ -9201,6 +9359,18 @@
   <p:clrMapOvr>
     <a:masterClrMapping/>
   </p:clrMapOvr>
+  <mc:AlternateContent xmlns:mc="http://schemas.openxmlformats.org/markup-compatibility/2006">
+    <mc:Choice xmlns:p14="http://schemas.microsoft.com/office/powerpoint/2010/main" Requires="p14">
+      <p:transition spd="med" p14:dur="700">
+        <p:fade/>
+      </p:transition>
+    </mc:Choice>
+    <mc:Fallback>
+      <p:transition xmlns:p14="http://schemas.microsoft.com/office/powerpoint/2010/main" spd="med">
+        <p:fade/>
+      </p:transition>
+    </mc:Fallback>
+  </mc:AlternateContent>
 </p:sld>
 </file>
 
@@ -9303,6 +9473,25 @@
   <p:clrMapOvr>
     <a:masterClrMapping/>
   </p:clrMapOvr>
+  <mc:AlternateContent xmlns:mc="http://schemas.openxmlformats.org/markup-compatibility/2006">
+    <mc:Choice xmlns:p14="http://schemas.microsoft.com/office/powerpoint/2010/main" Requires="p14">
+      <p:transition spd="med" p14:dur="700">
+        <p:fade/>
+      </p:transition>
+    </mc:Choice>
+    <mc:Fallback>
+      <p:transition xmlns:p14="http://schemas.microsoft.com/office/powerpoint/2010/main" spd="med">
+        <p:fade/>
+      </p:transition>
+    </mc:Fallback>
+  </mc:AlternateContent>
+  <p:timing>
+    <p:tnLst>
+      <p:par>
+        <p:cTn xmlns:p14="http://schemas.microsoft.com/office/powerpoint/2010/main" id="1" dur="indefinite" restart="never" nodeType="tmRoot"/>
+      </p:par>
+    </p:tnLst>
+  </p:timing>
 </p:sld>
 </file>
 
@@ -9342,7 +9531,6 @@
               <a:rPr lang="en-US" dirty="0"/>
               <a:t>Chapter Summary</a:t>
             </a:r>
-            <a:endParaRPr lang="en-US" dirty="0"/>
           </a:p>
         </p:txBody>
       </p:sp>
@@ -9397,17 +9585,21 @@
   </p:clrMapOvr>
   <mc:AlternateContent xmlns:mc="http://schemas.openxmlformats.org/markup-compatibility/2006">
     <mc:Choice xmlns:p14="http://schemas.microsoft.com/office/powerpoint/2010/main" Requires="p14">
-      <p:transition spd="slow" p14:dur="2000"/>
+      <p:transition spd="med" p14:dur="700">
+        <p:fade/>
+      </p:transition>
     </mc:Choice>
     <mc:Fallback>
-      <p:transition xmlns:p14="http://schemas.microsoft.com/office/powerpoint/2010/main" spd="slow"/>
+      <p:transition xmlns:p14="http://schemas.microsoft.com/office/powerpoint/2010/main" spd="med">
+        <p:fade/>
+      </p:transition>
     </mc:Fallback>
   </mc:AlternateContent>
 </p:sld>
 </file>
 
 <file path=ppt/slides/slide26.xml><?xml version="1.0" encoding="utf-8"?>
-<p:sld xmlns:a="http://schemas.openxmlformats.org/drawingml/2006/main" xmlns:r="http://schemas.openxmlformats.org/officeDocument/2006/relationships" xmlns:p="http://schemas.openxmlformats.org/presentationml/2006/main">
+<p:sld xmlns:a="http://schemas.openxmlformats.org/drawingml/2006/main" xmlns:r="http://schemas.openxmlformats.org/officeDocument/2006/relationships" xmlns:p="http://schemas.openxmlformats.org/presentationml/2006/main" show="0">
   <p:cSld>
     <p:spTree>
       <p:nvGrpSpPr>
@@ -9461,7 +9653,6 @@
               <a:rPr lang="en-US" dirty="0"/>
               <a:t>Questions</a:t>
             </a:r>
-            <a:endParaRPr lang="en-US" dirty="0"/>
           </a:p>
         </p:txBody>
       </p:sp>
@@ -9475,11 +9666,30 @@
   <p:clrMapOvr>
     <a:masterClrMapping/>
   </p:clrMapOvr>
+  <mc:AlternateContent xmlns:mc="http://schemas.openxmlformats.org/markup-compatibility/2006">
+    <mc:Choice xmlns:p14="http://schemas.microsoft.com/office/powerpoint/2010/main" Requires="p14">
+      <p:transition spd="med" p14:dur="700">
+        <p:fade/>
+      </p:transition>
+    </mc:Choice>
+    <mc:Fallback>
+      <p:transition xmlns:p14="http://schemas.microsoft.com/office/powerpoint/2010/main" spd="med">
+        <p:fade/>
+      </p:transition>
+    </mc:Fallback>
+  </mc:AlternateContent>
+  <p:timing>
+    <p:tnLst>
+      <p:par>
+        <p:cTn xmlns:p14="http://schemas.microsoft.com/office/powerpoint/2010/main" id="1" dur="indefinite" restart="never" nodeType="tmRoot"/>
+      </p:par>
+    </p:tnLst>
+  </p:timing>
 </p:sld>
 </file>
 
 <file path=ppt/slides/slide27.xml><?xml version="1.0" encoding="utf-8"?>
-<p:sld xmlns:a="http://schemas.openxmlformats.org/drawingml/2006/main" xmlns:r="http://schemas.openxmlformats.org/officeDocument/2006/relationships" xmlns:p="http://schemas.openxmlformats.org/presentationml/2006/main">
+<p:sld xmlns:a="http://schemas.openxmlformats.org/drawingml/2006/main" xmlns:r="http://schemas.openxmlformats.org/officeDocument/2006/relationships" xmlns:p="http://schemas.openxmlformats.org/presentationml/2006/main" show="0">
   <p:cSld>
     <p:spTree>
       <p:nvGrpSpPr>
@@ -9614,11 +9824,23 @@
   <p:clrMapOvr>
     <a:masterClrMapping/>
   </p:clrMapOvr>
+  <mc:AlternateContent xmlns:mc="http://schemas.openxmlformats.org/markup-compatibility/2006">
+    <mc:Choice xmlns:p14="http://schemas.microsoft.com/office/powerpoint/2010/main" Requires="p14">
+      <p:transition spd="med" p14:dur="700">
+        <p:fade/>
+      </p:transition>
+    </mc:Choice>
+    <mc:Fallback>
+      <p:transition xmlns:p14="http://schemas.microsoft.com/office/powerpoint/2010/main" spd="med">
+        <p:fade/>
+      </p:transition>
+    </mc:Fallback>
+  </mc:AlternateContent>
 </p:sld>
 </file>
 
 <file path=ppt/slides/slide28.xml><?xml version="1.0" encoding="utf-8"?>
-<p:sld xmlns:a="http://schemas.openxmlformats.org/drawingml/2006/main" xmlns:r="http://schemas.openxmlformats.org/officeDocument/2006/relationships" xmlns:p="http://schemas.openxmlformats.org/presentationml/2006/main">
+<p:sld xmlns:a="http://schemas.openxmlformats.org/drawingml/2006/main" xmlns:r="http://schemas.openxmlformats.org/officeDocument/2006/relationships" xmlns:p="http://schemas.openxmlformats.org/presentationml/2006/main" show="0">
   <p:cSld>
     <p:spTree>
       <p:nvGrpSpPr>
@@ -9730,7 +9952,6 @@
               <a:rPr lang="en-US" dirty="0"/>
               <a:t>has to do with how things are and why.</a:t>
             </a:r>
-            <a:endParaRPr lang="en-US" dirty="0"/>
           </a:p>
         </p:txBody>
       </p:sp>
@@ -9744,11 +9965,23 @@
   <p:clrMapOvr>
     <a:masterClrMapping/>
   </p:clrMapOvr>
+  <mc:AlternateContent xmlns:mc="http://schemas.openxmlformats.org/markup-compatibility/2006">
+    <mc:Choice xmlns:p14="http://schemas.microsoft.com/office/powerpoint/2010/main" Requires="p14">
+      <p:transition spd="med" p14:dur="700">
+        <p:fade/>
+      </p:transition>
+    </mc:Choice>
+    <mc:Fallback>
+      <p:transition xmlns:p14="http://schemas.microsoft.com/office/powerpoint/2010/main" spd="med">
+        <p:fade/>
+      </p:transition>
+    </mc:Fallback>
+  </mc:AlternateContent>
 </p:sld>
 </file>
 
 <file path=ppt/slides/slide29.xml><?xml version="1.0" encoding="utf-8"?>
-<p:sld xmlns:a="http://schemas.openxmlformats.org/drawingml/2006/main" xmlns:r="http://schemas.openxmlformats.org/officeDocument/2006/relationships" xmlns:p="http://schemas.openxmlformats.org/presentationml/2006/main">
+<p:sld xmlns:a="http://schemas.openxmlformats.org/drawingml/2006/main" xmlns:r="http://schemas.openxmlformats.org/officeDocument/2006/relationships" xmlns:p="http://schemas.openxmlformats.org/presentationml/2006/main" show="0">
   <p:cSld>
     <p:spTree>
       <p:nvGrpSpPr>
@@ -9863,7 +10096,6 @@
               <a:rPr lang="en-US" dirty="0"/>
               <a:t>relationships.</a:t>
             </a:r>
-            <a:endParaRPr lang="en-US" dirty="0"/>
           </a:p>
         </p:txBody>
       </p:sp>
@@ -9877,6 +10109,18 @@
   <p:clrMapOvr>
     <a:masterClrMapping/>
   </p:clrMapOvr>
+  <mc:AlternateContent xmlns:mc="http://schemas.openxmlformats.org/markup-compatibility/2006">
+    <mc:Choice xmlns:p14="http://schemas.microsoft.com/office/powerpoint/2010/main" Requires="p14">
+      <p:transition spd="med" p14:dur="700">
+        <p:fade/>
+      </p:transition>
+    </mc:Choice>
+    <mc:Fallback>
+      <p:transition xmlns:p14="http://schemas.microsoft.com/office/powerpoint/2010/main" spd="med">
+        <p:fade/>
+      </p:transition>
+    </mc:Fallback>
+  </mc:AlternateContent>
 </p:sld>
 </file>
 
@@ -9973,11 +10217,23 @@
   <p:clrMapOvr>
     <a:masterClrMapping/>
   </p:clrMapOvr>
+  <mc:AlternateContent xmlns:mc="http://schemas.openxmlformats.org/markup-compatibility/2006">
+    <mc:Choice xmlns:p14="http://schemas.microsoft.com/office/powerpoint/2010/main" Requires="p14">
+      <p:transition spd="med" p14:dur="700">
+        <p:fade/>
+      </p:transition>
+    </mc:Choice>
+    <mc:Fallback>
+      <p:transition xmlns:p14="http://schemas.microsoft.com/office/powerpoint/2010/main" spd="med">
+        <p:fade/>
+      </p:transition>
+    </mc:Fallback>
+  </mc:AlternateContent>
 </p:sld>
 </file>
 
 <file path=ppt/slides/slide30.xml><?xml version="1.0" encoding="utf-8"?>
-<p:sld xmlns:a="http://schemas.openxmlformats.org/drawingml/2006/main" xmlns:r="http://schemas.openxmlformats.org/officeDocument/2006/relationships" xmlns:p="http://schemas.openxmlformats.org/presentationml/2006/main">
+<p:sld xmlns:a="http://schemas.openxmlformats.org/drawingml/2006/main" xmlns:r="http://schemas.openxmlformats.org/officeDocument/2006/relationships" xmlns:p="http://schemas.openxmlformats.org/presentationml/2006/main" show="0">
   <p:cSld>
     <p:spTree>
       <p:nvGrpSpPr>
@@ -10106,11 +10362,23 @@
   <p:clrMapOvr>
     <a:masterClrMapping/>
   </p:clrMapOvr>
+  <mc:AlternateContent xmlns:mc="http://schemas.openxmlformats.org/markup-compatibility/2006">
+    <mc:Choice xmlns:p14="http://schemas.microsoft.com/office/powerpoint/2010/main" Requires="p14">
+      <p:transition spd="med" p14:dur="700">
+        <p:fade/>
+      </p:transition>
+    </mc:Choice>
+    <mc:Fallback>
+      <p:transition xmlns:p14="http://schemas.microsoft.com/office/powerpoint/2010/main" spd="med">
+        <p:fade/>
+      </p:transition>
+    </mc:Fallback>
+  </mc:AlternateContent>
 </p:sld>
 </file>
 
 <file path=ppt/slides/slide31.xml><?xml version="1.0" encoding="utf-8"?>
-<p:sld xmlns:a="http://schemas.openxmlformats.org/drawingml/2006/main" xmlns:r="http://schemas.openxmlformats.org/officeDocument/2006/relationships" xmlns:p="http://schemas.openxmlformats.org/presentationml/2006/main">
+<p:sld xmlns:a="http://schemas.openxmlformats.org/drawingml/2006/main" xmlns:r="http://schemas.openxmlformats.org/officeDocument/2006/relationships" xmlns:p="http://schemas.openxmlformats.org/presentationml/2006/main" show="0">
   <p:cSld>
     <p:spTree>
       <p:nvGrpSpPr>
@@ -10215,7 +10483,6 @@
               <a:rPr lang="en-US" dirty="0"/>
               <a:t>Neither of the above are true.</a:t>
             </a:r>
-            <a:endParaRPr lang="en-US" dirty="0"/>
           </a:p>
         </p:txBody>
       </p:sp>
@@ -10229,11 +10496,23 @@
   <p:clrMapOvr>
     <a:masterClrMapping/>
   </p:clrMapOvr>
+  <mc:AlternateContent xmlns:mc="http://schemas.openxmlformats.org/markup-compatibility/2006">
+    <mc:Choice xmlns:p14="http://schemas.microsoft.com/office/powerpoint/2010/main" Requires="p14">
+      <p:transition spd="med" p14:dur="700">
+        <p:fade/>
+      </p:transition>
+    </mc:Choice>
+    <mc:Fallback>
+      <p:transition xmlns:p14="http://schemas.microsoft.com/office/powerpoint/2010/main" spd="med">
+        <p:fade/>
+      </p:transition>
+    </mc:Fallback>
+  </mc:AlternateContent>
 </p:sld>
 </file>
 
 <file path=ppt/slides/slide32.xml><?xml version="1.0" encoding="utf-8"?>
-<p:sld xmlns:a="http://schemas.openxmlformats.org/drawingml/2006/main" xmlns:r="http://schemas.openxmlformats.org/officeDocument/2006/relationships" xmlns:p="http://schemas.openxmlformats.org/presentationml/2006/main">
+<p:sld xmlns:a="http://schemas.openxmlformats.org/drawingml/2006/main" xmlns:r="http://schemas.openxmlformats.org/officeDocument/2006/relationships" xmlns:p="http://schemas.openxmlformats.org/presentationml/2006/main" show="0">
   <p:cSld>
     <p:spTree>
       <p:nvGrpSpPr>
@@ -10268,7 +10547,6 @@
               <a:rPr lang="en-US" dirty="0"/>
               <a:t>Question 6</a:t>
             </a:r>
-            <a:endParaRPr lang="en-US" dirty="0"/>
           </a:p>
         </p:txBody>
       </p:sp>
@@ -10356,6 +10634,18 @@
   <p:clrMapOvr>
     <a:masterClrMapping/>
   </p:clrMapOvr>
+  <mc:AlternateContent xmlns:mc="http://schemas.openxmlformats.org/markup-compatibility/2006">
+    <mc:Choice xmlns:p14="http://schemas.microsoft.com/office/powerpoint/2010/main" Requires="p14">
+      <p:transition spd="med" p14:dur="700">
+        <p:fade/>
+      </p:transition>
+    </mc:Choice>
+    <mc:Fallback>
+      <p:transition xmlns:p14="http://schemas.microsoft.com/office/powerpoint/2010/main" spd="med">
+        <p:fade/>
+      </p:transition>
+    </mc:Fallback>
+  </mc:AlternateContent>
 </p:sld>
 </file>
 
@@ -10423,39 +10713,14 @@
             <a:pPr lvl="1"/>
             <a:r>
               <a:rPr lang="en-US" dirty="0" smtClean="0"/>
-              <a:t>We desire to </a:t>
-            </a:r>
-            <a:r>
-              <a:rPr lang="en-US" dirty="0" smtClean="0"/>
-              <a:t>predict the </a:t>
-            </a:r>
-            <a:r>
-              <a:rPr lang="en-US" dirty="0" smtClean="0"/>
-              <a:t>future</a:t>
-            </a:r>
-            <a:endParaRPr lang="en-US" dirty="0" smtClean="0"/>
+              <a:t>We desire to predict the future</a:t>
+            </a:r>
           </a:p>
           <a:p>
             <a:pPr lvl="2"/>
             <a:r>
               <a:rPr lang="en-US" dirty="0" smtClean="0"/>
-              <a:t>future </a:t>
-            </a:r>
-            <a:r>
-              <a:rPr lang="en-US" dirty="0" smtClean="0"/>
-              <a:t>is </a:t>
-            </a:r>
-            <a:r>
-              <a:rPr lang="en-US" dirty="0" smtClean="0"/>
-              <a:t>caused/affected by </a:t>
-            </a:r>
-            <a:r>
-              <a:rPr lang="en-US" dirty="0" smtClean="0"/>
-              <a:t>the </a:t>
-            </a:r>
-            <a:r>
-              <a:rPr lang="en-US" dirty="0" smtClean="0"/>
-              <a:t>present</a:t>
+              <a:t>future is caused/affected by the present</a:t>
             </a:r>
           </a:p>
           <a:p>
@@ -10496,6 +10761,18 @@
   <p:clrMapOvr>
     <a:masterClrMapping/>
   </p:clrMapOvr>
+  <mc:AlternateContent xmlns:mc="http://schemas.openxmlformats.org/markup-compatibility/2006">
+    <mc:Choice xmlns:p14="http://schemas.microsoft.com/office/powerpoint/2010/main" Requires="p14">
+      <p:transition spd="med" p14:dur="700">
+        <p:fade/>
+      </p:transition>
+    </mc:Choice>
+    <mc:Fallback>
+      <p:transition xmlns:p14="http://schemas.microsoft.com/office/powerpoint/2010/main" spd="med">
+        <p:fade/>
+      </p:transition>
+    </mc:Fallback>
+  </mc:AlternateContent>
 </p:sld>
 </file>
 
@@ -10558,15 +10835,7 @@
           <a:p>
             <a:r>
               <a:rPr lang="en-US" dirty="0" smtClean="0"/>
-              <a:t>Errors </a:t>
-            </a:r>
-            <a:r>
-              <a:rPr lang="en-US" dirty="0" smtClean="0"/>
-              <a:t>in Human </a:t>
-            </a:r>
-            <a:r>
-              <a:rPr lang="en-US" dirty="0" smtClean="0"/>
-              <a:t>Inquiry and Some Solutions</a:t>
+              <a:t>Errors in Human Inquiry and Some Solutions</a:t>
             </a:r>
           </a:p>
           <a:p>
@@ -10634,6 +10903,18 @@
   <p:clrMapOvr>
     <a:masterClrMapping/>
   </p:clrMapOvr>
+  <mc:AlternateContent xmlns:mc="http://schemas.openxmlformats.org/markup-compatibility/2006">
+    <mc:Choice xmlns:p14="http://schemas.microsoft.com/office/powerpoint/2010/main" Requires="p14">
+      <p:transition spd="med" p14:dur="700">
+        <p:fade/>
+      </p:transition>
+    </mc:Choice>
+    <mc:Fallback>
+      <p:transition xmlns:p14="http://schemas.microsoft.com/office/powerpoint/2010/main" spd="med">
+        <p:fade/>
+      </p:transition>
+    </mc:Fallback>
+  </mc:AlternateContent>
 </p:sld>
 </file>
 
@@ -10673,7 +10954,6 @@
               <a:rPr lang="en-US" dirty="0"/>
               <a:t>Looking for Reality </a:t>
             </a:r>
-            <a:endParaRPr lang="en-US" dirty="0"/>
           </a:p>
         </p:txBody>
       </p:sp>
@@ -10745,6 +11025,18 @@
   <p:clrMapOvr>
     <a:masterClrMapping/>
   </p:clrMapOvr>
+  <mc:AlternateContent xmlns:mc="http://schemas.openxmlformats.org/markup-compatibility/2006">
+    <mc:Choice xmlns:p14="http://schemas.microsoft.com/office/powerpoint/2010/main" Requires="p14">
+      <p:transition spd="med" p14:dur="700">
+        <p:fade/>
+      </p:transition>
+    </mc:Choice>
+    <mc:Fallback>
+      <p:transition xmlns:p14="http://schemas.microsoft.com/office/powerpoint/2010/main" spd="med">
+        <p:fade/>
+      </p:transition>
+    </mc:Fallback>
+  </mc:AlternateContent>
 </p:sld>
 </file>
 
@@ -10809,7 +11101,6 @@
               <a:rPr lang="en-US" dirty="0" smtClean="0"/>
               <a:t>Ordinary human inquiry differs from scientific inquiry</a:t>
             </a:r>
-            <a:endParaRPr lang="en-US" dirty="0" smtClean="0"/>
           </a:p>
           <a:p>
             <a:endParaRPr lang="en-US" dirty="0"/>
@@ -10826,6 +11117,18 @@
   <p:clrMapOvr>
     <a:masterClrMapping/>
   </p:clrMapOvr>
+  <mc:AlternateContent xmlns:mc="http://schemas.openxmlformats.org/markup-compatibility/2006">
+    <mc:Choice xmlns:p14="http://schemas.microsoft.com/office/powerpoint/2010/main" Requires="p14">
+      <p:transition spd="med" p14:dur="700">
+        <p:fade/>
+      </p:transition>
+    </mc:Choice>
+    <mc:Fallback>
+      <p:transition xmlns:p14="http://schemas.microsoft.com/office/powerpoint/2010/main" spd="med">
+        <p:fade/>
+      </p:transition>
+    </mc:Fallback>
+  </mc:AlternateContent>
 </p:sld>
 </file>
 
@@ -10886,15 +11189,7 @@
           <a:p>
             <a:r>
               <a:rPr lang="en-US" dirty="0" smtClean="0"/>
-              <a:t>Scientific </a:t>
-            </a:r>
-            <a:r>
-              <a:rPr lang="en-US" dirty="0" smtClean="0"/>
-              <a:t>inquiry </a:t>
-            </a:r>
-            <a:r>
-              <a:rPr lang="en-US" dirty="0" smtClean="0"/>
-              <a:t>about the social world</a:t>
+              <a:t>Scientific inquiry about the social world</a:t>
             </a:r>
           </a:p>
           <a:p>
@@ -10919,6 +11214,18 @@
   <p:clrMapOvr>
     <a:masterClrMapping/>
   </p:clrMapOvr>
+  <mc:AlternateContent xmlns:mc="http://schemas.openxmlformats.org/markup-compatibility/2006">
+    <mc:Choice xmlns:p14="http://schemas.microsoft.com/office/powerpoint/2010/main" Requires="p14">
+      <p:transition spd="med" p14:dur="700">
+        <p:fade/>
+      </p:transition>
+    </mc:Choice>
+    <mc:Fallback>
+      <p:transition xmlns:p14="http://schemas.microsoft.com/office/powerpoint/2010/main" spd="med">
+        <p:fade/>
+      </p:transition>
+    </mc:Fallback>
+  </mc:AlternateContent>
 </p:sld>
 </file>
 
@@ -11018,6 +11325,18 @@
   <p:clrMapOvr>
     <a:masterClrMapping/>
   </p:clrMapOvr>
+  <mc:AlternateContent xmlns:mc="http://schemas.openxmlformats.org/markup-compatibility/2006">
+    <mc:Choice xmlns:p14="http://schemas.microsoft.com/office/powerpoint/2010/main" Requires="p14">
+      <p:transition spd="med" p14:dur="700">
+        <p:fade/>
+      </p:transition>
+    </mc:Choice>
+    <mc:Fallback>
+      <p:transition xmlns:p14="http://schemas.microsoft.com/office/powerpoint/2010/main" spd="med">
+        <p:fade/>
+      </p:transition>
+    </mc:Fallback>
+  </mc:AlternateContent>
 </p:sld>
 </file>
 

</xml_diff>